<commit_message>
Fixed opening slide names
</commit_message>
<xml_diff>
--- a/deliverables/Release 2/NVMe Partner's Day Final.pptx
+++ b/deliverables/Release 2/NVMe Partner's Day Final.pptx
@@ -118,7 +118,7 @@
   </p:defaultTextStyle>
   <p:extLst>
     <p:ext uri="{EFAFB233-063F-42B5-8137-9DF3F51BA10A}">
-      <p15:sldGuideLst xmlns="" xmlns:p15="http://schemas.microsoft.com/office/powerpoint/2012/main">
+      <p15:sldGuideLst xmlns:p15="http://schemas.microsoft.com/office/powerpoint/2012/main" xmlns="">
         <p15:guide id="1" orient="horz" pos="2160">
           <p15:clr>
             <a:srgbClr val="A4A3A4"/>
@@ -387,7 +387,7 @@
     </p:spTree>
     <p:extLst>
       <p:ext uri="{BB962C8B-B14F-4D97-AF65-F5344CB8AC3E}">
-        <p14:creationId xmlns:p14="http://schemas.microsoft.com/office/powerpoint/2010/main" xmlns="" val="877372202"/>
+        <p14:creationId xmlns="" xmlns:p14="http://schemas.microsoft.com/office/powerpoint/2010/main" val="877372202"/>
       </p:ext>
     </p:extLst>
   </p:cSld>
@@ -719,6 +719,7 @@
           <a:p>
             <a:fld id="{61362B01-0A86-4233-A7D0-94F1921C1115}" type="datetime1">
               <a:rPr lang="en-US" smtClean="0"/>
+              <a:pPr/>
               <a:t>5/20/2016</a:t>
             </a:fld>
             <a:endParaRPr lang="en-US" dirty="0"/>
@@ -1006,6 +1007,7 @@
           <a:p>
             <a:fld id="{5A39FD82-CD7B-48D2-8F3A-D92AB9AE98A9}" type="datetime1">
               <a:rPr lang="en-US" smtClean="0"/>
+              <a:pPr/>
               <a:t>5/20/2016</a:t>
             </a:fld>
             <a:endParaRPr lang="en-US" dirty="0"/>
@@ -1182,6 +1184,7 @@
           <a:p>
             <a:fld id="{621E989F-9C15-4C6A-BD1D-3455DC7116F3}" type="datetime1">
               <a:rPr lang="en-US" smtClean="0"/>
+              <a:pPr/>
               <a:t>5/20/2016</a:t>
             </a:fld>
             <a:endParaRPr lang="en-US" dirty="0"/>
@@ -1431,6 +1434,7 @@
           <a:p>
             <a:fld id="{B0C435DF-D197-4C5D-AB28-F2D90B88D94E}" type="datetime1">
               <a:rPr lang="en-US" smtClean="0"/>
+              <a:pPr/>
               <a:t>5/20/2016</a:t>
             </a:fld>
             <a:endParaRPr lang="en-US" dirty="0"/>
@@ -1701,6 +1705,7 @@
           <a:p>
             <a:fld id="{2D6ECEDE-6143-488F-956F-DAFB41F6608B}" type="datetime1">
               <a:rPr lang="en-US" smtClean="0"/>
+              <a:pPr/>
               <a:t>5/20/2016</a:t>
             </a:fld>
             <a:endParaRPr lang="en-US" dirty="0"/>
@@ -2055,6 +2060,7 @@
           <a:p>
             <a:fld id="{EB5CE444-A3B9-4CAD-A8CF-D39D35E44A6E}" type="datetime1">
               <a:rPr lang="en-US" smtClean="0"/>
+              <a:pPr/>
               <a:t>5/20/2016</a:t>
             </a:fld>
             <a:endParaRPr lang="en-US" dirty="0"/>
@@ -2430,6 +2436,7 @@
           <a:p>
             <a:fld id="{DF27EE9B-93DC-4C05-B7AA-98128238E842}" type="datetime1">
               <a:rPr lang="en-US" smtClean="0"/>
+              <a:pPr/>
               <a:t>5/20/2016</a:t>
             </a:fld>
             <a:endParaRPr lang="en-US" dirty="0"/>
@@ -2551,6 +2558,7 @@
           <a:p>
             <a:fld id="{885E1D8B-1BBA-40B9-8DAD-F7E2036BF5A4}" type="datetime1">
               <a:rPr lang="en-US" smtClean="0"/>
+              <a:pPr/>
               <a:t>5/20/2016</a:t>
             </a:fld>
             <a:endParaRPr lang="en-US" dirty="0"/>
@@ -2642,6 +2650,7 @@
           <a:p>
             <a:fld id="{A3770E82-4816-4C96-9E1F-18B673F90B0E}" type="datetime1">
               <a:rPr lang="en-US" smtClean="0"/>
+              <a:pPr/>
               <a:t>5/20/2016</a:t>
             </a:fld>
             <a:endParaRPr lang="en-US" dirty="0"/>
@@ -3075,6 +3084,7 @@
           <a:p>
             <a:fld id="{03831D8F-BC61-440F-BA9A-E47BA4E0A8B9}" type="datetime1">
               <a:rPr lang="en-US" smtClean="0"/>
+              <a:pPr/>
               <a:t>5/20/2016</a:t>
             </a:fld>
             <a:endParaRPr lang="en-US" dirty="0"/>
@@ -3455,6 +3465,7 @@
           <a:p>
             <a:fld id="{FBAECCBD-515E-4AA4-9B62-7FC0C014143F}" type="datetime1">
               <a:rPr lang="en-US" smtClean="0"/>
+              <a:pPr/>
               <a:t>5/20/2016</a:t>
             </a:fld>
             <a:endParaRPr lang="en-US" dirty="0"/>
@@ -3745,6 +3756,7 @@
           <a:p>
             <a:fld id="{49BC5A68-F83F-4F1C-BA73-E4FDDF22D19B}" type="datetime1">
               <a:rPr lang="en-US" smtClean="0"/>
+              <a:pPr/>
               <a:t>5/20/2016</a:t>
             </a:fld>
             <a:endParaRPr lang="en-US" dirty="0"/>
@@ -4466,75 +4478,6 @@
           </a:bodyPr>
           <a:lstStyle/>
           <a:p>
-            <a:pPr lvl="0">
-              <a:spcBef>
-                <a:spcPts val="0"/>
-              </a:spcBef>
-              <a:spcAft>
-                <a:spcPts val="0"/>
-              </a:spcAft>
-              <a:buSzPct val="25000"/>
-            </a:pPr>
-            <a:r>
-              <a:rPr lang="en-US" b="1" cap="none" dirty="0" smtClean="0">
-                <a:solidFill>
-                  <a:schemeClr val="dk2"/>
-                </a:solidFill>
-                <a:latin typeface="Calibri"/>
-                <a:ea typeface="Calibri"/>
-                <a:cs typeface="Calibri"/>
-                <a:sym typeface="Calibri"/>
-              </a:rPr>
-              <a:t>TEAM MEMBERS:</a:t>
-            </a:r>
-          </a:p>
-          <a:p>
-            <a:pPr lvl="0">
-              <a:spcBef>
-                <a:spcPts val="1400"/>
-              </a:spcBef>
-              <a:spcAft>
-                <a:spcPts val="0"/>
-              </a:spcAft>
-              <a:buSzPct val="25000"/>
-            </a:pPr>
-            <a:r>
-              <a:rPr lang="en-US" cap="none" dirty="0" smtClean="0">
-                <a:solidFill>
-                  <a:schemeClr val="dk2"/>
-                </a:solidFill>
-                <a:latin typeface="Calibri"/>
-                <a:ea typeface="Calibri"/>
-                <a:cs typeface="Calibri"/>
-                <a:sym typeface="Calibri"/>
-              </a:rPr>
-              <a:t>JOHN GEMIGNANI</a:t>
-            </a:r>
-          </a:p>
-          <a:p>
-            <a:pPr lvl="0">
-              <a:spcBef>
-                <a:spcPts val="1400"/>
-              </a:spcBef>
-              <a:spcAft>
-                <a:spcPts val="0"/>
-              </a:spcAft>
-              <a:buSzPct val="25000"/>
-            </a:pPr>
-            <a:r>
-              <a:rPr lang="en-US" cap="none" dirty="0" smtClean="0">
-                <a:solidFill>
-                  <a:schemeClr val="dk2"/>
-                </a:solidFill>
-                <a:latin typeface="Calibri"/>
-                <a:ea typeface="Calibri"/>
-                <a:cs typeface="Calibri"/>
-                <a:sym typeface="Calibri"/>
-              </a:rPr>
-              <a:t>COY HUMPHREY</a:t>
-            </a:r>
-          </a:p>
-          <a:p>
             <a:pPr lvl="0" algn="r">
               <a:spcBef>
                 <a:spcPts val="1400"/>
@@ -4568,7 +4511,7 @@
           <a:blip r:embed="rId3">
             <a:extLst>
               <a:ext uri="{BEBA8EAE-BF5A-486C-A8C5-ECC9F3942E4B}">
-                <a14:imgProps xmlns:a14="http://schemas.microsoft.com/office/drawing/2010/main" xmlns="">
+                <a14:imgProps xmlns="" xmlns:a14="http://schemas.microsoft.com/office/drawing/2010/main">
                   <a14:imgLayer r:embed="rId4">
                     <a14:imgEffect>
                       <a14:backgroundRemoval t="158" b="100000" l="0" r="100000">
@@ -4583,7 +4526,7 @@
                 </a14:imgProps>
               </a:ext>
               <a:ext uri="{28A0092B-C50C-407E-A947-70E740481C1C}">
-                <a14:useLocalDpi xmlns:a14="http://schemas.microsoft.com/office/drawing/2010/main" xmlns="" val="0"/>
+                <a14:useLocalDpi xmlns="" xmlns:a14="http://schemas.microsoft.com/office/drawing/2010/main" val="0"/>
               </a:ext>
             </a:extLst>
           </a:blip>
@@ -4775,10 +4718,191 @@
           </a:p>
         </p:txBody>
       </p:sp>
+      <p:sp>
+        <p:nvSpPr>
+          <p:cNvPr id="11" name="Shape 198"/>
+          <p:cNvSpPr txBox="1">
+            <a:spLocks/>
+          </p:cNvSpPr>
+          <p:nvPr/>
+        </p:nvSpPr>
+        <p:spPr>
+          <a:xfrm>
+            <a:off x="1100050" y="4892765"/>
+            <a:ext cx="2645100" cy="1440600"/>
+          </a:xfrm>
+          <a:prstGeom prst="rect">
+            <a:avLst/>
+          </a:prstGeom>
+          <a:noFill/>
+          <a:ln>
+            <a:noFill/>
+          </a:ln>
+        </p:spPr>
+        <p:txBody>
+          <a:bodyPr lIns="91425" tIns="45700" rIns="91425" bIns="45700" anchor="ctr" anchorCtr="0">
+            <a:noAutofit/>
+          </a:bodyPr>
+          <a:lstStyle/>
+          <a:p>
+            <a:pPr marL="0" marR="0" lvl="0" indent="0" algn="l" defTabSz="914400" rtl="0" eaLnBrk="1" fontAlgn="auto" latinLnBrk="0" hangingPunct="1">
+              <a:lnSpc>
+                <a:spcPct val="90000"/>
+              </a:lnSpc>
+              <a:spcBef>
+                <a:spcPts val="0"/>
+              </a:spcBef>
+              <a:spcAft>
+                <a:spcPts val="0"/>
+              </a:spcAft>
+              <a:buClr>
+                <a:srgbClr val="FF0000"/>
+              </a:buClr>
+              <a:buSzPct val="25000"/>
+              <a:buFont typeface="Calibri"/>
+              <a:buNone/>
+              <a:tabLst/>
+              <a:defRPr/>
+            </a:pPr>
+            <a:r>
+              <a:rPr kumimoji="0" lang="en-US" sz="2400" b="1" i="0" u="none" strike="noStrike" kern="0" cap="none" spc="0" normalizeH="0" baseline="0" noProof="0" smtClean="0">
+                <a:ln>
+                  <a:noFill/>
+                </a:ln>
+                <a:solidFill>
+                  <a:srgbClr val="696464"/>
+                </a:solidFill>
+                <a:effectLst/>
+                <a:uLnTx/>
+                <a:uFillTx/>
+                <a:latin typeface="Calibri"/>
+                <a:ea typeface="Calibri"/>
+                <a:cs typeface="Calibri"/>
+                <a:sym typeface="Calibri"/>
+              </a:rPr>
+              <a:t>TEAM MEMBERS:</a:t>
+            </a:r>
+          </a:p>
+          <a:p>
+            <a:pPr marL="0" marR="0" lvl="0" indent="0" algn="l" defTabSz="914400" rtl="0" eaLnBrk="1" fontAlgn="auto" latinLnBrk="0" hangingPunct="1">
+              <a:lnSpc>
+                <a:spcPct val="90000"/>
+              </a:lnSpc>
+              <a:spcBef>
+                <a:spcPts val="1400"/>
+              </a:spcBef>
+              <a:spcAft>
+                <a:spcPts val="0"/>
+              </a:spcAft>
+              <a:buClr>
+                <a:srgbClr val="FF0000"/>
+              </a:buClr>
+              <a:buSzPct val="25000"/>
+              <a:buFont typeface="Calibri"/>
+              <a:buNone/>
+              <a:tabLst/>
+              <a:defRPr/>
+            </a:pPr>
+            <a:r>
+              <a:rPr kumimoji="0" lang="en-US" sz="2400" b="0" i="0" u="none" strike="noStrike" kern="0" cap="none" spc="0" normalizeH="0" baseline="0" noProof="0" smtClean="0">
+                <a:ln>
+                  <a:noFill/>
+                </a:ln>
+                <a:solidFill>
+                  <a:srgbClr val="696464"/>
+                </a:solidFill>
+                <a:effectLst/>
+                <a:uLnTx/>
+                <a:uFillTx/>
+                <a:latin typeface="Calibri"/>
+                <a:ea typeface="Calibri"/>
+                <a:cs typeface="Calibri"/>
+                <a:sym typeface="Calibri"/>
+              </a:rPr>
+              <a:t>JOHN GEMIGNANI</a:t>
+            </a:r>
+          </a:p>
+          <a:p>
+            <a:pPr marL="0" marR="0" lvl="0" indent="0" algn="l" defTabSz="914400" rtl="0" eaLnBrk="1" fontAlgn="auto" latinLnBrk="0" hangingPunct="1">
+              <a:lnSpc>
+                <a:spcPct val="90000"/>
+              </a:lnSpc>
+              <a:spcBef>
+                <a:spcPts val="1400"/>
+              </a:spcBef>
+              <a:spcAft>
+                <a:spcPts val="0"/>
+              </a:spcAft>
+              <a:buClr>
+                <a:srgbClr val="FF0000"/>
+              </a:buClr>
+              <a:buSzPct val="25000"/>
+              <a:buFont typeface="Calibri"/>
+              <a:buNone/>
+              <a:tabLst/>
+              <a:defRPr/>
+            </a:pPr>
+            <a:r>
+              <a:rPr kumimoji="0" lang="en-US" sz="2400" b="0" i="0" u="none" strike="noStrike" kern="0" cap="none" spc="0" normalizeH="0" baseline="0" noProof="0" smtClean="0">
+                <a:ln>
+                  <a:noFill/>
+                </a:ln>
+                <a:solidFill>
+                  <a:srgbClr val="696464"/>
+                </a:solidFill>
+                <a:effectLst/>
+                <a:uLnTx/>
+                <a:uFillTx/>
+                <a:latin typeface="Calibri"/>
+                <a:ea typeface="Calibri"/>
+                <a:cs typeface="Calibri"/>
+                <a:sym typeface="Calibri"/>
+              </a:rPr>
+              <a:t>COY HUMPHREY</a:t>
+            </a:r>
+          </a:p>
+          <a:p>
+            <a:pPr marL="0" marR="0" lvl="0" indent="0" algn="r" defTabSz="914400" rtl="0" eaLnBrk="1" fontAlgn="auto" latinLnBrk="0" hangingPunct="1">
+              <a:lnSpc>
+                <a:spcPct val="90000"/>
+              </a:lnSpc>
+              <a:spcBef>
+                <a:spcPts val="1400"/>
+              </a:spcBef>
+              <a:spcAft>
+                <a:spcPts val="0"/>
+              </a:spcAft>
+              <a:buClr>
+                <a:srgbClr val="FF0000"/>
+              </a:buClr>
+              <a:buSzPct val="25000"/>
+              <a:buFont typeface="Calibri"/>
+              <a:buNone/>
+              <a:tabLst/>
+              <a:defRPr/>
+            </a:pPr>
+            <a:endParaRPr kumimoji="0" lang="en-US" sz="2400" b="0" i="0" u="none" strike="noStrike" kern="0" cap="none" spc="0" normalizeH="0" baseline="0" noProof="0" dirty="0">
+              <a:ln>
+                <a:noFill/>
+              </a:ln>
+              <a:solidFill>
+                <a:srgbClr val="696464"/>
+              </a:solidFill>
+              <a:effectLst/>
+              <a:uLnTx/>
+              <a:uFillTx/>
+              <a:latin typeface="Calibri"/>
+              <a:ea typeface="Calibri"/>
+              <a:cs typeface="Calibri"/>
+              <a:sym typeface="Calibri"/>
+            </a:endParaRPr>
+          </a:p>
+        </p:txBody>
+      </p:sp>
     </p:spTree>
     <p:extLst>
       <p:ext uri="{BB962C8B-B14F-4D97-AF65-F5344CB8AC3E}">
-        <p14:creationId xmlns:p14="http://schemas.microsoft.com/office/powerpoint/2010/main" xmlns="" val="3488360670"/>
+        <p14:creationId xmlns="" xmlns:p14="http://schemas.microsoft.com/office/powerpoint/2010/main" val="3488360670"/>
       </p:ext>
     </p:extLst>
   </p:cSld>
@@ -4888,11 +5012,7 @@
             </a:r>
             <a:r>
               <a:rPr lang="en-US" dirty="0" smtClean="0"/>
-              <a:t>, Ph.D., Distinguished Technologist, Storage Chief Technologist Office </a:t>
-            </a:r>
-            <a:r>
-              <a:rPr lang="en-US" dirty="0" smtClean="0"/>
-              <a:t>at Hewlett        Packard Enterprise</a:t>
+              <a:t>, Ph.D., Distinguished Technologist, Storage Chief Technologist Office at Hewlett        Packard Enterprise</a:t>
             </a:r>
           </a:p>
           <a:p>
@@ -4906,11 +5026,7 @@
             </a:pPr>
             <a:r>
               <a:rPr lang="en-US" dirty="0" smtClean="0"/>
-              <a:t> Dr. Linda Werner, Ph.D., Faculty Advisor, </a:t>
-            </a:r>
-            <a:r>
-              <a:rPr lang="en-US" dirty="0" smtClean="0"/>
-              <a:t>UCSC</a:t>
+              <a:t> Dr. Linda Werner, Ph.D., Faculty Advisor, UCSC</a:t>
             </a:r>
           </a:p>
           <a:p>
@@ -4932,11 +5048,7 @@
             </a:r>
             <a:r>
               <a:rPr lang="en-US" dirty="0" smtClean="0"/>
-              <a:t>, Graduate Teaching Assistant, </a:t>
-            </a:r>
-            <a:r>
-              <a:rPr lang="en-US" dirty="0" smtClean="0"/>
-              <a:t>UCSC</a:t>
+              <a:t>, Graduate Teaching Assistant, UCSC</a:t>
             </a:r>
           </a:p>
           <a:p>
@@ -5024,7 +5136,7 @@
     </p:spTree>
     <p:extLst>
       <p:ext uri="{BB962C8B-B14F-4D97-AF65-F5344CB8AC3E}">
-        <p14:creationId xmlns:p14="http://schemas.microsoft.com/office/powerpoint/2010/main" xmlns="" val="1822668284"/>
+        <p14:creationId xmlns="" xmlns:p14="http://schemas.microsoft.com/office/powerpoint/2010/main" val="1822668284"/>
       </p:ext>
     </p:extLst>
   </p:cSld>
@@ -5082,13 +5194,7 @@
               <a:rPr lang="en-US" dirty="0" smtClean="0">
                 <a:latin typeface="+mn-lt"/>
               </a:rPr>
-              <a:t>Problem </a:t>
-            </a:r>
-            <a:r>
-              <a:rPr lang="en-US" dirty="0" smtClean="0">
-                <a:latin typeface="+mn-lt"/>
-              </a:rPr>
-              <a:t>Statement</a:t>
+              <a:t>Problem Statement</a:t>
             </a:r>
             <a:endParaRPr lang="en-US" dirty="0">
               <a:latin typeface="+mn-lt"/>
@@ -6649,7 +6755,7 @@
     </p:spTree>
     <p:extLst>
       <p:ext uri="{BB962C8B-B14F-4D97-AF65-F5344CB8AC3E}">
-        <p14:creationId xmlns:p14="http://schemas.microsoft.com/office/powerpoint/2010/main" xmlns="" val="675447979"/>
+        <p14:creationId xmlns="" xmlns:p14="http://schemas.microsoft.com/office/powerpoint/2010/main" val="675447979"/>
       </p:ext>
     </p:extLst>
   </p:cSld>
@@ -7131,7 +7237,7 @@
     </p:spTree>
     <p:extLst>
       <p:ext uri="{BB962C8B-B14F-4D97-AF65-F5344CB8AC3E}">
-        <p14:creationId xmlns:p14="http://schemas.microsoft.com/office/powerpoint/2010/main" xmlns="" val="2151381247"/>
+        <p14:creationId xmlns="" xmlns:p14="http://schemas.microsoft.com/office/powerpoint/2010/main" val="2151381247"/>
       </p:ext>
     </p:extLst>
   </p:cSld>
@@ -8369,7 +8475,7 @@
     </p:spTree>
     <p:extLst>
       <p:ext uri="{BB962C8B-B14F-4D97-AF65-F5344CB8AC3E}">
-        <p14:creationId xmlns:p14="http://schemas.microsoft.com/office/powerpoint/2010/main" xmlns="" val="1371219152"/>
+        <p14:creationId xmlns="" xmlns:p14="http://schemas.microsoft.com/office/powerpoint/2010/main" val="1371219152"/>
       </p:ext>
     </p:extLst>
   </p:cSld>
@@ -8529,7 +8635,7 @@
     </p:spTree>
     <p:extLst>
       <p:ext uri="{BB962C8B-B14F-4D97-AF65-F5344CB8AC3E}">
-        <p14:creationId xmlns:p14="http://schemas.microsoft.com/office/powerpoint/2010/main" xmlns="" val="2260543410"/>
+        <p14:creationId xmlns="" xmlns:p14="http://schemas.microsoft.com/office/powerpoint/2010/main" val="2260543410"/>
       </p:ext>
     </p:extLst>
   </p:cSld>
@@ -9776,7 +9882,7 @@
     </p:spTree>
     <p:extLst>
       <p:ext uri="{BB962C8B-B14F-4D97-AF65-F5344CB8AC3E}">
-        <p14:creationId xmlns:p14="http://schemas.microsoft.com/office/powerpoint/2010/main" xmlns="" val="4031993031"/>
+        <p14:creationId xmlns="" xmlns:p14="http://schemas.microsoft.com/office/powerpoint/2010/main" val="4031993031"/>
       </p:ext>
     </p:extLst>
   </p:cSld>
@@ -10313,7 +10419,7 @@
   <a:extraClrSchemeLst/>
   <a:extLst>
     <a:ext uri="{05A4C25C-085E-4340-85A3-A5531E510DB2}">
-      <thm15:themeFamily xmlns="" xmlns:thm15="http://schemas.microsoft.com/office/thememl/2012/main" name="Retrospect" id="{5F128B03-DCCA-4EEB-AB3B-CF2899314A46}" vid="{02006FA4-1611-4B07-AF7F-85CF6D20EB3E}"/>
+      <thm15:themeFamily xmlns:thm15="http://schemas.microsoft.com/office/thememl/2012/main" xmlns="" name="Retrospect" id="{5F128B03-DCCA-4EEB-AB3B-CF2899314A46}" vid="{02006FA4-1611-4B07-AF7F-85CF6D20EB3E}"/>
     </a:ext>
   </a:extLst>
 </a:theme>
@@ -10574,7 +10680,7 @@
   <a:extraClrSchemeLst/>
   <a:extLst>
     <a:ext uri="{05A4C25C-085E-4340-85A3-A5531E510DB2}">
-      <thm15:themeFamily xmlns="" xmlns:thm15="http://schemas.microsoft.com/office/thememl/2012/main" name="Office Theme" id="{62F939B6-93AF-4DB8-9C6B-D6C7DFDC589F}" vid="{4A3C46E8-61CC-4603-A589-7422A47A8E4A}"/>
+      <thm15:themeFamily xmlns:thm15="http://schemas.microsoft.com/office/thememl/2012/main" xmlns="" name="Office Theme" id="{62F939B6-93AF-4DB8-9C6B-D6C7DFDC589F}" vid="{4A3C46E8-61CC-4603-A589-7422A47A8E4A}"/>
     </a:ext>
   </a:extLst>
 </a:theme>

</xml_diff>

<commit_message>
Removed extra spacing on thanks to slide
</commit_message>
<xml_diff>
--- a/deliverables/Release 2/NVMe Partner's Day Final.pptx
+++ b/deliverables/Release 2/NVMe Partner's Day Final.pptx
@@ -118,7 +118,7 @@
   </p:defaultTextStyle>
   <p:extLst>
     <p:ext uri="{EFAFB233-063F-42B5-8137-9DF3F51BA10A}">
-      <p15:sldGuideLst xmlns:p15="http://schemas.microsoft.com/office/powerpoint/2012/main" xmlns="">
+      <p15:sldGuideLst xmlns="" xmlns:p15="http://schemas.microsoft.com/office/powerpoint/2012/main">
         <p15:guide id="1" orient="horz" pos="2160">
           <p15:clr>
             <a:srgbClr val="A4A3A4"/>
@@ -218,7 +218,7 @@
             <a:fld id="{8DA19F56-ACA0-41AC-8B57-A442F5EEA315}" type="datetimeFigureOut">
               <a:rPr lang="en-US" smtClean="0"/>
               <a:pPr/>
-              <a:t>5/20/2016</a:t>
+              <a:t>5/21/2016</a:t>
             </a:fld>
             <a:endParaRPr lang="en-US" dirty="0"/>
           </a:p>
@@ -387,7 +387,7 @@
     </p:spTree>
     <p:extLst>
       <p:ext uri="{BB962C8B-B14F-4D97-AF65-F5344CB8AC3E}">
-        <p14:creationId xmlns="" xmlns:p14="http://schemas.microsoft.com/office/powerpoint/2010/main" val="877372202"/>
+        <p14:creationId xmlns:p14="http://schemas.microsoft.com/office/powerpoint/2010/main" xmlns="" val="877372202"/>
       </p:ext>
     </p:extLst>
   </p:cSld>
@@ -720,7 +720,7 @@
             <a:fld id="{61362B01-0A86-4233-A7D0-94F1921C1115}" type="datetime1">
               <a:rPr lang="en-US" smtClean="0"/>
               <a:pPr/>
-              <a:t>5/20/2016</a:t>
+              <a:t>5/21/2016</a:t>
             </a:fld>
             <a:endParaRPr lang="en-US" dirty="0"/>
           </a:p>
@@ -1008,7 +1008,7 @@
             <a:fld id="{5A39FD82-CD7B-48D2-8F3A-D92AB9AE98A9}" type="datetime1">
               <a:rPr lang="en-US" smtClean="0"/>
               <a:pPr/>
-              <a:t>5/20/2016</a:t>
+              <a:t>5/21/2016</a:t>
             </a:fld>
             <a:endParaRPr lang="en-US" dirty="0"/>
           </a:p>
@@ -1185,7 +1185,7 @@
             <a:fld id="{621E989F-9C15-4C6A-BD1D-3455DC7116F3}" type="datetime1">
               <a:rPr lang="en-US" smtClean="0"/>
               <a:pPr/>
-              <a:t>5/20/2016</a:t>
+              <a:t>5/21/2016</a:t>
             </a:fld>
             <a:endParaRPr lang="en-US" dirty="0"/>
           </a:p>
@@ -1435,7 +1435,7 @@
             <a:fld id="{B0C435DF-D197-4C5D-AB28-F2D90B88D94E}" type="datetime1">
               <a:rPr lang="en-US" smtClean="0"/>
               <a:pPr/>
-              <a:t>5/20/2016</a:t>
+              <a:t>5/21/2016</a:t>
             </a:fld>
             <a:endParaRPr lang="en-US" dirty="0"/>
           </a:p>
@@ -1706,7 +1706,7 @@
             <a:fld id="{2D6ECEDE-6143-488F-956F-DAFB41F6608B}" type="datetime1">
               <a:rPr lang="en-US" smtClean="0"/>
               <a:pPr/>
-              <a:t>5/20/2016</a:t>
+              <a:t>5/21/2016</a:t>
             </a:fld>
             <a:endParaRPr lang="en-US" dirty="0"/>
           </a:p>
@@ -2061,7 +2061,7 @@
             <a:fld id="{EB5CE444-A3B9-4CAD-A8CF-D39D35E44A6E}" type="datetime1">
               <a:rPr lang="en-US" smtClean="0"/>
               <a:pPr/>
-              <a:t>5/20/2016</a:t>
+              <a:t>5/21/2016</a:t>
             </a:fld>
             <a:endParaRPr lang="en-US" dirty="0"/>
           </a:p>
@@ -2437,7 +2437,7 @@
             <a:fld id="{DF27EE9B-93DC-4C05-B7AA-98128238E842}" type="datetime1">
               <a:rPr lang="en-US" smtClean="0"/>
               <a:pPr/>
-              <a:t>5/20/2016</a:t>
+              <a:t>5/21/2016</a:t>
             </a:fld>
             <a:endParaRPr lang="en-US" dirty="0"/>
           </a:p>
@@ -2559,7 +2559,7 @@
             <a:fld id="{885E1D8B-1BBA-40B9-8DAD-F7E2036BF5A4}" type="datetime1">
               <a:rPr lang="en-US" smtClean="0"/>
               <a:pPr/>
-              <a:t>5/20/2016</a:t>
+              <a:t>5/21/2016</a:t>
             </a:fld>
             <a:endParaRPr lang="en-US" dirty="0"/>
           </a:p>
@@ -2651,7 +2651,7 @@
             <a:fld id="{A3770E82-4816-4C96-9E1F-18B673F90B0E}" type="datetime1">
               <a:rPr lang="en-US" smtClean="0"/>
               <a:pPr/>
-              <a:t>5/20/2016</a:t>
+              <a:t>5/21/2016</a:t>
             </a:fld>
             <a:endParaRPr lang="en-US" dirty="0"/>
           </a:p>
@@ -3085,7 +3085,7 @@
             <a:fld id="{03831D8F-BC61-440F-BA9A-E47BA4E0A8B9}" type="datetime1">
               <a:rPr lang="en-US" smtClean="0"/>
               <a:pPr/>
-              <a:t>5/20/2016</a:t>
+              <a:t>5/21/2016</a:t>
             </a:fld>
             <a:endParaRPr lang="en-US" dirty="0"/>
           </a:p>
@@ -3466,7 +3466,7 @@
             <a:fld id="{FBAECCBD-515E-4AA4-9B62-7FC0C014143F}" type="datetime1">
               <a:rPr lang="en-US" smtClean="0"/>
               <a:pPr/>
-              <a:t>5/20/2016</a:t>
+              <a:t>5/21/2016</a:t>
             </a:fld>
             <a:endParaRPr lang="en-US" dirty="0"/>
           </a:p>
@@ -3757,7 +3757,7 @@
             <a:fld id="{49BC5A68-F83F-4F1C-BA73-E4FDDF22D19B}" type="datetime1">
               <a:rPr lang="en-US" smtClean="0"/>
               <a:pPr/>
-              <a:t>5/20/2016</a:t>
+              <a:t>5/21/2016</a:t>
             </a:fld>
             <a:endParaRPr lang="en-US" dirty="0"/>
           </a:p>
@@ -4511,7 +4511,7 @@
           <a:blip r:embed="rId3">
             <a:extLst>
               <a:ext uri="{BEBA8EAE-BF5A-486C-A8C5-ECC9F3942E4B}">
-                <a14:imgProps xmlns="" xmlns:a14="http://schemas.microsoft.com/office/drawing/2010/main">
+                <a14:imgProps xmlns:a14="http://schemas.microsoft.com/office/drawing/2010/main" xmlns="">
                   <a14:imgLayer r:embed="rId4">
                     <a14:imgEffect>
                       <a14:backgroundRemoval t="158" b="100000" l="0" r="100000">
@@ -4526,7 +4526,7 @@
                 </a14:imgProps>
               </a:ext>
               <a:ext uri="{28A0092B-C50C-407E-A947-70E740481C1C}">
-                <a14:useLocalDpi xmlns="" xmlns:a14="http://schemas.microsoft.com/office/drawing/2010/main" val="0"/>
+                <a14:useLocalDpi xmlns:a14="http://schemas.microsoft.com/office/drawing/2010/main" xmlns="" val="0"/>
               </a:ext>
             </a:extLst>
           </a:blip>
@@ -4902,7 +4902,7 @@
     </p:spTree>
     <p:extLst>
       <p:ext uri="{BB962C8B-B14F-4D97-AF65-F5344CB8AC3E}">
-        <p14:creationId xmlns="" xmlns:p14="http://schemas.microsoft.com/office/powerpoint/2010/main" val="3488360670"/>
+        <p14:creationId xmlns:p14="http://schemas.microsoft.com/office/powerpoint/2010/main" xmlns="" val="3488360670"/>
       </p:ext>
     </p:extLst>
   </p:cSld>
@@ -5012,7 +5012,15 @@
             </a:r>
             <a:r>
               <a:rPr lang="en-US" dirty="0" smtClean="0"/>
-              <a:t>, Ph.D., Distinguished Technologist, Storage Chief Technologist Office at Hewlett        Packard Enterprise</a:t>
+              <a:t>, Ph.D., Distinguished Technologist, Storage Chief Technologist Office at </a:t>
+            </a:r>
+            <a:r>
+              <a:rPr lang="en-US" dirty="0" smtClean="0"/>
+              <a:t>Hewlett Packard </a:t>
+            </a:r>
+            <a:r>
+              <a:rPr lang="en-US" dirty="0" smtClean="0"/>
+              <a:t>Enterprise</a:t>
             </a:r>
           </a:p>
           <a:p>
@@ -5136,7 +5144,7 @@
     </p:spTree>
     <p:extLst>
       <p:ext uri="{BB962C8B-B14F-4D97-AF65-F5344CB8AC3E}">
-        <p14:creationId xmlns="" xmlns:p14="http://schemas.microsoft.com/office/powerpoint/2010/main" val="1822668284"/>
+        <p14:creationId xmlns:p14="http://schemas.microsoft.com/office/powerpoint/2010/main" xmlns="" val="1822668284"/>
       </p:ext>
     </p:extLst>
   </p:cSld>
@@ -6755,7 +6763,7 @@
     </p:spTree>
     <p:extLst>
       <p:ext uri="{BB962C8B-B14F-4D97-AF65-F5344CB8AC3E}">
-        <p14:creationId xmlns="" xmlns:p14="http://schemas.microsoft.com/office/powerpoint/2010/main" val="675447979"/>
+        <p14:creationId xmlns:p14="http://schemas.microsoft.com/office/powerpoint/2010/main" xmlns="" val="675447979"/>
       </p:ext>
     </p:extLst>
   </p:cSld>
@@ -7237,7 +7245,7 @@
     </p:spTree>
     <p:extLst>
       <p:ext uri="{BB962C8B-B14F-4D97-AF65-F5344CB8AC3E}">
-        <p14:creationId xmlns="" xmlns:p14="http://schemas.microsoft.com/office/powerpoint/2010/main" val="2151381247"/>
+        <p14:creationId xmlns:p14="http://schemas.microsoft.com/office/powerpoint/2010/main" xmlns="" val="2151381247"/>
       </p:ext>
     </p:extLst>
   </p:cSld>
@@ -8475,7 +8483,7 @@
     </p:spTree>
     <p:extLst>
       <p:ext uri="{BB962C8B-B14F-4D97-AF65-F5344CB8AC3E}">
-        <p14:creationId xmlns="" xmlns:p14="http://schemas.microsoft.com/office/powerpoint/2010/main" val="1371219152"/>
+        <p14:creationId xmlns:p14="http://schemas.microsoft.com/office/powerpoint/2010/main" xmlns="" val="1371219152"/>
       </p:ext>
     </p:extLst>
   </p:cSld>
@@ -8635,7 +8643,7 @@
     </p:spTree>
     <p:extLst>
       <p:ext uri="{BB962C8B-B14F-4D97-AF65-F5344CB8AC3E}">
-        <p14:creationId xmlns="" xmlns:p14="http://schemas.microsoft.com/office/powerpoint/2010/main" val="2260543410"/>
+        <p14:creationId xmlns:p14="http://schemas.microsoft.com/office/powerpoint/2010/main" xmlns="" val="2260543410"/>
       </p:ext>
     </p:extLst>
   </p:cSld>
@@ -9882,7 +9890,7 @@
     </p:spTree>
     <p:extLst>
       <p:ext uri="{BB962C8B-B14F-4D97-AF65-F5344CB8AC3E}">
-        <p14:creationId xmlns="" xmlns:p14="http://schemas.microsoft.com/office/powerpoint/2010/main" val="4031993031"/>
+        <p14:creationId xmlns:p14="http://schemas.microsoft.com/office/powerpoint/2010/main" xmlns="" val="4031993031"/>
       </p:ext>
     </p:extLst>
   </p:cSld>
@@ -10419,7 +10427,7 @@
   <a:extraClrSchemeLst/>
   <a:extLst>
     <a:ext uri="{05A4C25C-085E-4340-85A3-A5531E510DB2}">
-      <thm15:themeFamily xmlns:thm15="http://schemas.microsoft.com/office/thememl/2012/main" xmlns="" name="Retrospect" id="{5F128B03-DCCA-4EEB-AB3B-CF2899314A46}" vid="{02006FA4-1611-4B07-AF7F-85CF6D20EB3E}"/>
+      <thm15:themeFamily xmlns="" xmlns:thm15="http://schemas.microsoft.com/office/thememl/2012/main" name="Retrospect" id="{5F128B03-DCCA-4EEB-AB3B-CF2899314A46}" vid="{02006FA4-1611-4B07-AF7F-85CF6D20EB3E}"/>
     </a:ext>
   </a:extLst>
 </a:theme>
@@ -10680,7 +10688,7 @@
   <a:extraClrSchemeLst/>
   <a:extLst>
     <a:ext uri="{05A4C25C-085E-4340-85A3-A5531E510DB2}">
-      <thm15:themeFamily xmlns:thm15="http://schemas.microsoft.com/office/thememl/2012/main" xmlns="" name="Office Theme" id="{62F939B6-93AF-4DB8-9C6B-D6C7DFDC589F}" vid="{4A3C46E8-61CC-4603-A589-7422A47A8E4A}"/>
+      <thm15:themeFamily xmlns="" xmlns:thm15="http://schemas.microsoft.com/office/thememl/2012/main" name="Office Theme" id="{62F939B6-93AF-4DB8-9C6B-D6C7DFDC589F}" vid="{4A3C46E8-61CC-4603-A589-7422A47A8E4A}"/>
     </a:ext>
   </a:extLst>
 </a:theme>

</xml_diff>